<commit_message>
conclusão das atualizações para 2019
</commit_message>
<xml_diff>
--- a/building-games-for-XboxOne.pptx
+++ b/building-games-for-XboxOne.pptx
@@ -224,7 +224,7 @@
           <a:p>
             <a:fld id="{94D3EB41-CF60-4C9F-BD83-AE56FA0945EB}" type="datetimeFigureOut">
               <a:rPr lang="pt-BR" smtClean="0"/>
-              <a:t>28/05/2019</a:t>
+              <a:t>29/05/2019</a:t>
             </a:fld>
             <a:endParaRPr lang="pt-BR"/>
           </a:p>
@@ -734,7 +734,7 @@
           <a:p>
             <a:fld id="{9642BF85-54FF-46CE-B398-87F998CFD60B}" type="datetimeFigureOut">
               <a:rPr lang="pt-BR" smtClean="0"/>
-              <a:t>28/05/2019</a:t>
+              <a:t>29/05/2019</a:t>
             </a:fld>
             <a:endParaRPr lang="pt-BR"/>
           </a:p>
@@ -902,7 +902,7 @@
           <a:p>
             <a:fld id="{9642BF85-54FF-46CE-B398-87F998CFD60B}" type="datetimeFigureOut">
               <a:rPr lang="pt-BR" smtClean="0"/>
-              <a:t>28/05/2019</a:t>
+              <a:t>29/05/2019</a:t>
             </a:fld>
             <a:endParaRPr lang="pt-BR"/>
           </a:p>
@@ -1080,7 +1080,7 @@
           <a:p>
             <a:fld id="{9642BF85-54FF-46CE-B398-87F998CFD60B}" type="datetimeFigureOut">
               <a:rPr lang="pt-BR" smtClean="0"/>
-              <a:t>28/05/2019</a:t>
+              <a:t>29/05/2019</a:t>
             </a:fld>
             <a:endParaRPr lang="pt-BR"/>
           </a:p>
@@ -1417,7 +1417,7 @@
           <a:p>
             <a:fld id="{9642BF85-54FF-46CE-B398-87F998CFD60B}" type="datetimeFigureOut">
               <a:rPr lang="pt-BR" smtClean="0"/>
-              <a:t>28/05/2019</a:t>
+              <a:t>29/05/2019</a:t>
             </a:fld>
             <a:endParaRPr lang="pt-BR"/>
           </a:p>
@@ -1688,7 +1688,7 @@
           <a:p>
             <a:fld id="{9642BF85-54FF-46CE-B398-87F998CFD60B}" type="datetimeFigureOut">
               <a:rPr lang="pt-BR" smtClean="0"/>
-              <a:t>28/05/2019</a:t>
+              <a:t>29/05/2019</a:t>
             </a:fld>
             <a:endParaRPr lang="pt-BR"/>
           </a:p>
@@ -1934,7 +1934,7 @@
           <a:p>
             <a:fld id="{9642BF85-54FF-46CE-B398-87F998CFD60B}" type="datetimeFigureOut">
               <a:rPr lang="pt-BR" smtClean="0"/>
-              <a:t>28/05/2019</a:t>
+              <a:t>29/05/2019</a:t>
             </a:fld>
             <a:endParaRPr lang="pt-BR"/>
           </a:p>
@@ -2298,7 +2298,7 @@
           <a:p>
             <a:fld id="{9642BF85-54FF-46CE-B398-87F998CFD60B}" type="datetimeFigureOut">
               <a:rPr lang="pt-BR" smtClean="0"/>
-              <a:t>28/05/2019</a:t>
+              <a:t>29/05/2019</a:t>
             </a:fld>
             <a:endParaRPr lang="pt-BR"/>
           </a:p>
@@ -2432,7 +2432,7 @@
           <a:p>
             <a:fld id="{9642BF85-54FF-46CE-B398-87F998CFD60B}" type="datetimeFigureOut">
               <a:rPr lang="pt-BR" smtClean="0"/>
-              <a:t>28/05/2019</a:t>
+              <a:t>29/05/2019</a:t>
             </a:fld>
             <a:endParaRPr lang="pt-BR"/>
           </a:p>
@@ -2527,7 +2527,7 @@
           <a:p>
             <a:fld id="{9642BF85-54FF-46CE-B398-87F998CFD60B}" type="datetimeFigureOut">
               <a:rPr lang="pt-BR" smtClean="0"/>
-              <a:t>28/05/2019</a:t>
+              <a:t>29/05/2019</a:t>
             </a:fld>
             <a:endParaRPr lang="pt-BR"/>
           </a:p>
@@ -2802,7 +2802,7 @@
           <a:p>
             <a:fld id="{9642BF85-54FF-46CE-B398-87F998CFD60B}" type="datetimeFigureOut">
               <a:rPr lang="pt-BR" smtClean="0"/>
-              <a:t>28/05/2019</a:t>
+              <a:t>29/05/2019</a:t>
             </a:fld>
             <a:endParaRPr lang="pt-BR"/>
           </a:p>
@@ -3054,7 +3054,7 @@
           <a:p>
             <a:fld id="{9642BF85-54FF-46CE-B398-87F998CFD60B}" type="datetimeFigureOut">
               <a:rPr lang="pt-BR" smtClean="0"/>
-              <a:t>28/05/2019</a:t>
+              <a:t>29/05/2019</a:t>
             </a:fld>
             <a:endParaRPr lang="pt-BR"/>
           </a:p>
@@ -3274,7 +3274,7 @@
           <a:p>
             <a:fld id="{9642BF85-54FF-46CE-B398-87F998CFD60B}" type="datetimeFigureOut">
               <a:rPr lang="pt-BR" smtClean="0"/>
-              <a:t>28/05/2019</a:t>
+              <a:t>29/05/2019</a:t>
             </a:fld>
             <a:endParaRPr lang="pt-BR"/>
           </a:p>
@@ -4079,38 +4079,6 @@
           </a:p>
         </p:txBody>
       </p:sp>
-      <p:pic>
-        <p:nvPicPr>
-          <p:cNvPr id="4" name="Content Placeholder 3">
-            <a:extLst>
-              <a:ext uri="{FF2B5EF4-FFF2-40B4-BE49-F238E27FC236}">
-                <a16:creationId xmlns:a16="http://schemas.microsoft.com/office/drawing/2014/main" id="{BE3318C4-11F2-48A3-AD5D-F5AA294998DD}"/>
-              </a:ext>
-            </a:extLst>
-          </p:cNvPr>
-          <p:cNvPicPr>
-            <a:picLocks noGrp="1" noChangeAspect="1"/>
-          </p:cNvPicPr>
-          <p:nvPr>
-            <p:ph sz="half" idx="2"/>
-          </p:nvPr>
-        </p:nvPicPr>
-        <p:blipFill>
-          <a:blip r:embed="rId2"/>
-          <a:stretch>
-            <a:fillRect/>
-          </a:stretch>
-        </p:blipFill>
-        <p:spPr>
-          <a:xfrm>
-            <a:off x="6519675" y="1825625"/>
-            <a:ext cx="4289839" cy="4160464"/>
-          </a:xfrm>
-          <a:prstGeom prst="rect">
-            <a:avLst/>
-          </a:prstGeom>
-        </p:spPr>
-      </p:pic>
       <p:sp>
         <p:nvSpPr>
           <p:cNvPr id="10" name="Título 4">
@@ -4174,6 +4142,30 @@
           </a:p>
         </p:txBody>
       </p:sp>
+      <p:pic>
+        <p:nvPicPr>
+          <p:cNvPr id="2" name="Imagem 1"/>
+          <p:cNvPicPr>
+            <a:picLocks noChangeAspect="1"/>
+          </p:cNvPicPr>
+          <p:nvPr/>
+        </p:nvPicPr>
+        <p:blipFill>
+          <a:blip r:embed="rId2"/>
+          <a:stretch>
+            <a:fillRect/>
+          </a:stretch>
+        </p:blipFill>
+        <p:spPr>
+          <a:xfrm>
+            <a:off x="6519675" y="1825626"/>
+            <a:ext cx="4289841" cy="4160464"/>
+          </a:xfrm>
+          <a:prstGeom prst="rect">
+            <a:avLst/>
+          </a:prstGeom>
+        </p:spPr>
+      </p:pic>
     </p:spTree>
     <p:extLst>
       <p:ext uri="{BB962C8B-B14F-4D97-AF65-F5344CB8AC3E}">
@@ -4240,8 +4232,95 @@
           <a:lstStyle/>
           <a:p>
             <a:r>
+              <a:rPr lang="en-US" dirty="0" err="1" smtClean="0"/>
+              <a:t>Altere</a:t>
+            </a:r>
+            <a:r>
+              <a:rPr lang="en-US" dirty="0" smtClean="0"/>
+              <a:t> o valor de </a:t>
+            </a:r>
+            <a:r>
+              <a:rPr lang="en-US" b="1" i="1" dirty="0" smtClean="0"/>
+              <a:t>Build configuration</a:t>
+            </a:r>
+            <a:r>
+              <a:rPr lang="en-US" dirty="0" smtClean="0"/>
+              <a:t> para </a:t>
+            </a:r>
+            <a:r>
+              <a:rPr lang="en-US" b="1" i="1" dirty="0" smtClean="0"/>
+              <a:t>Debug</a:t>
+            </a:r>
+            <a:r>
+              <a:rPr lang="en-US" dirty="0" smtClean="0"/>
+              <a:t>, </a:t>
+            </a:r>
+            <a:r>
+              <a:rPr lang="en-US" dirty="0" err="1" smtClean="0"/>
+              <a:t>mantenha</a:t>
+            </a:r>
+            <a:r>
+              <a:rPr lang="en-US" dirty="0" smtClean="0"/>
+              <a:t> </a:t>
+            </a:r>
+            <a:r>
+              <a:rPr lang="en-US" dirty="0" err="1" smtClean="0"/>
+              <a:t>os</a:t>
+            </a:r>
+            <a:r>
+              <a:rPr lang="en-US" dirty="0" smtClean="0"/>
+              <a:t> </a:t>
+            </a:r>
+            <a:r>
+              <a:rPr lang="en-US" dirty="0" err="1" smtClean="0"/>
+              <a:t>demais</a:t>
+            </a:r>
+            <a:r>
+              <a:rPr lang="en-US" dirty="0" smtClean="0"/>
+              <a:t> </a:t>
+            </a:r>
+            <a:r>
+              <a:rPr lang="en-US" dirty="0" err="1" smtClean="0"/>
+              <a:t>campos</a:t>
+            </a:r>
+            <a:r>
+              <a:rPr lang="en-US" dirty="0" smtClean="0"/>
+              <a:t> com </a:t>
+            </a:r>
+            <a:r>
+              <a:rPr lang="en-US" dirty="0" err="1"/>
+              <a:t>os</a:t>
+            </a:r>
+            <a:r>
               <a:rPr lang="en-US" dirty="0"/>
-              <a:t>Caso </a:t>
+              <a:t> </a:t>
+            </a:r>
+            <a:r>
+              <a:rPr lang="en-US" dirty="0" err="1"/>
+              <a:t>valores</a:t>
+            </a:r>
+            <a:r>
+              <a:rPr lang="en-US" dirty="0"/>
+              <a:t> </a:t>
+            </a:r>
+            <a:r>
+              <a:rPr lang="en-US" dirty="0" err="1" smtClean="0"/>
+              <a:t>padrão</a:t>
+            </a:r>
+            <a:r>
+              <a:rPr lang="en-US" dirty="0"/>
+              <a:t>;</a:t>
+            </a:r>
+            <a:endParaRPr lang="en-US" dirty="0" smtClean="0"/>
+          </a:p>
+          <a:p>
+            <a:r>
+              <a:rPr lang="en-US" dirty="0" err="1"/>
+              <a:t>Caso</a:t>
+            </a:r>
+            <a:r>
+              <a:rPr lang="en-US" dirty="0"/>
+              <a:t> </a:t>
             </a:r>
             <a:r>
               <a:rPr lang="en-US" dirty="0" err="1"/>
@@ -4301,19 +4380,11 @@
             </a:r>
             <a:r>
               <a:rPr lang="en-US" i="1" dirty="0"/>
-              <a:t>scripting backend </a:t>
-            </a:r>
-            <a:r>
-              <a:rPr lang="en-US" i="1" dirty="0" smtClean="0"/>
-              <a:t>(.NET)</a:t>
-            </a:r>
-            <a:r>
-              <a:rPr lang="en-US" dirty="0" smtClean="0"/>
-              <a:t>, </a:t>
+              <a:t>scripting backend (.NET)</a:t>
             </a:r>
             <a:r>
               <a:rPr lang="en-US" dirty="0"/>
-              <a:t>clique no </a:t>
+              <a:t>, clique no </a:t>
             </a:r>
             <a:r>
               <a:rPr lang="en-US" dirty="0" err="1"/>
@@ -4388,131 +4459,39 @@
               <a:t> para </a:t>
             </a:r>
             <a:r>
-              <a:rPr lang="en-US" b="1" i="1" dirty="0" smtClean="0"/>
+              <a:rPr lang="en-US" b="1" i="1" dirty="0"/>
               <a:t>IL2CPP</a:t>
             </a:r>
             <a:r>
               <a:rPr lang="en-US" dirty="0" smtClean="0"/>
               <a:t>.</a:t>
             </a:r>
-            <a:endParaRPr lang="en-US" dirty="0"/>
-          </a:p>
-          <a:p>
+          </a:p>
+          <a:p>
+            <a:r>
+              <a:rPr lang="en-US" dirty="0" smtClean="0"/>
+              <a:t>Clique </a:t>
+            </a:r>
+            <a:r>
+              <a:rPr lang="en-US" dirty="0"/>
+              <a:t>no </a:t>
+            </a:r>
             <a:r>
               <a:rPr lang="en-US" dirty="0" err="1"/>
-              <a:t>Mantenha</a:t>
-            </a:r>
-            <a:r>
-              <a:rPr lang="en-US" dirty="0"/>
-              <a:t> as </a:t>
-            </a:r>
-            <a:r>
-              <a:rPr lang="en-US" dirty="0" err="1"/>
-              <a:t>demais</a:t>
+              <a:t>botão</a:t>
             </a:r>
             <a:r>
               <a:rPr lang="en-US" dirty="0"/>
               <a:t> </a:t>
             </a:r>
             <a:r>
-              <a:rPr lang="en-US" dirty="0" err="1"/>
-              <a:t>opções</a:t>
-            </a:r>
-            <a:r>
-              <a:rPr lang="en-US" dirty="0"/>
-              <a:t> da Caixa de </a:t>
-            </a:r>
-            <a:r>
-              <a:rPr lang="en-US" dirty="0" err="1"/>
-              <a:t>diálogo</a:t>
-            </a:r>
-            <a:r>
-              <a:rPr lang="en-US" dirty="0"/>
-              <a:t> </a:t>
-            </a:r>
-            <a:r>
-              <a:rPr lang="en-US" b="1" i="1" dirty="0"/>
-              <a:t>Build Settings</a:t>
-            </a:r>
-            <a:r>
-              <a:rPr lang="en-US" dirty="0"/>
-              <a:t> com </a:t>
-            </a:r>
-            <a:r>
-              <a:rPr lang="en-US" dirty="0" err="1"/>
-              <a:t>os</a:t>
-            </a:r>
-            <a:r>
-              <a:rPr lang="en-US" dirty="0"/>
-              <a:t> </a:t>
-            </a:r>
-            <a:r>
-              <a:rPr lang="en-US" dirty="0" err="1"/>
-              <a:t>valores</a:t>
-            </a:r>
-            <a:r>
-              <a:rPr lang="en-US" dirty="0"/>
-              <a:t> </a:t>
-            </a:r>
-            <a:r>
-              <a:rPr lang="en-US" dirty="0" err="1"/>
-              <a:t>padrão</a:t>
-            </a:r>
-            <a:r>
-              <a:rPr lang="en-US" dirty="0"/>
-              <a:t> e clique no </a:t>
-            </a:r>
-            <a:r>
-              <a:rPr lang="en-US" dirty="0" err="1"/>
-              <a:t>botão</a:t>
-            </a:r>
-            <a:r>
-              <a:rPr lang="en-US" dirty="0"/>
-              <a:t> </a:t>
-            </a:r>
-            <a:r>
-              <a:rPr lang="en-US" b="1" i="1" dirty="0"/>
-              <a:t>Build</a:t>
-            </a:r>
-            <a:r>
-              <a:rPr lang="en-US" dirty="0"/>
-              <a:t>.</a:t>
-            </a:r>
-          </a:p>
-        </p:txBody>
-      </p:sp>
-      <p:pic>
-        <p:nvPicPr>
-          <p:cNvPr id="6" name="Content Placeholder 5">
-            <a:extLst>
-              <a:ext uri="{FF2B5EF4-FFF2-40B4-BE49-F238E27FC236}">
-                <a16:creationId xmlns:a16="http://schemas.microsoft.com/office/drawing/2014/main" id="{E0EFE769-E844-4CAB-968D-F482F1F5EFF1}"/>
-              </a:ext>
-            </a:extLst>
-          </p:cNvPr>
-          <p:cNvPicPr>
-            <a:picLocks noGrp="1" noChangeAspect="1"/>
-          </p:cNvPicPr>
-          <p:nvPr>
-            <p:ph sz="half" idx="2"/>
-          </p:nvPr>
-        </p:nvPicPr>
-        <p:blipFill>
-          <a:blip r:embed="rId2"/>
-          <a:stretch>
-            <a:fillRect/>
-          </a:stretch>
-        </p:blipFill>
-        <p:spPr>
-          <a:xfrm>
-            <a:off x="7811426" y="1825625"/>
-            <a:ext cx="3221921" cy="2828018"/>
-          </a:xfrm>
-          <a:prstGeom prst="rect">
-            <a:avLst/>
-          </a:prstGeom>
-        </p:spPr>
-      </p:pic>
+              <a:rPr lang="en-US" b="1" i="1" dirty="0" smtClean="0"/>
+              <a:t>Build.</a:t>
+            </a:r>
+            <a:endParaRPr lang="en-US" dirty="0"/>
+          </a:p>
+        </p:txBody>
+      </p:sp>
       <p:sp>
         <p:nvSpPr>
           <p:cNvPr id="15" name="Título 4">
@@ -4576,6 +4555,30 @@
           </a:p>
         </p:txBody>
       </p:sp>
+      <p:pic>
+        <p:nvPicPr>
+          <p:cNvPr id="2" name="Imagem 1"/>
+          <p:cNvPicPr>
+            <a:picLocks noChangeAspect="1"/>
+          </p:cNvPicPr>
+          <p:nvPr/>
+        </p:nvPicPr>
+        <p:blipFill>
+          <a:blip r:embed="rId2"/>
+          <a:stretch>
+            <a:fillRect/>
+          </a:stretch>
+        </p:blipFill>
+        <p:spPr>
+          <a:xfrm>
+            <a:off x="7811426" y="1825625"/>
+            <a:ext cx="3981450" cy="1600200"/>
+          </a:xfrm>
+          <a:prstGeom prst="rect">
+            <a:avLst/>
+          </a:prstGeom>
+        </p:spPr>
+      </p:pic>
     </p:spTree>
     <p:extLst>
       <p:ext uri="{BB962C8B-B14F-4D97-AF65-F5344CB8AC3E}">
@@ -4698,13 +4701,7 @@
       </p:sp>
       <p:pic>
         <p:nvPicPr>
-          <p:cNvPr id="2" name="Picture 1">
-            <a:extLst>
-              <a:ext uri="{FF2B5EF4-FFF2-40B4-BE49-F238E27FC236}">
-                <a16:creationId xmlns:a16="http://schemas.microsoft.com/office/drawing/2014/main" id="{4DD4DEBC-697B-468F-B2B2-7D0DEA571B5C}"/>
-              </a:ext>
-            </a:extLst>
-          </p:cNvPr>
+          <p:cNvPr id="3" name="Imagem 2"/>
           <p:cNvPicPr>
             <a:picLocks noChangeAspect="1"/>
           </p:cNvPicPr>
@@ -4718,8 +4715,8 @@
         </p:blipFill>
         <p:spPr>
           <a:xfrm>
-            <a:off x="3309937" y="2537732"/>
-            <a:ext cx="5572125" cy="2076450"/>
+            <a:off x="2006991" y="2537732"/>
+            <a:ext cx="8178018" cy="2076450"/>
           </a:xfrm>
           <a:prstGeom prst="rect">
             <a:avLst/>
@@ -4928,7 +4925,6 @@
               <a:rPr lang="pt-BR" dirty="0" smtClean="0"/>
               <a:t>Caso o Visual Studio exiba a mensagem de erro abaixo ao tentar abrir o projeto, realize a instalação recomendada:</a:t>
             </a:r>
-            <a:endParaRPr lang="pt-BR" dirty="0" smtClean="0"/>
           </a:p>
           <a:p>
             <a:endParaRPr lang="pt-BR" dirty="0"/>
@@ -5049,44 +5045,58 @@
           <a:lstStyle/>
           <a:p>
             <a:r>
-              <a:rPr lang="pt-BR" dirty="0"/>
-              <a:t>Clique com o botão direito do mouse no nome do projeto e escolha a opção </a:t>
-            </a:r>
-            <a:r>
-              <a:rPr lang="pt-BR" b="1" i="1" dirty="0"/>
-              <a:t>Properties</a:t>
-            </a:r>
-            <a:r>
-              <a:rPr lang="pt-BR" dirty="0"/>
-              <a:t> para visualizar a aba de propriedades do projeto.</a:t>
-            </a:r>
+              <a:rPr lang="pt-BR" dirty="0" smtClean="0"/>
+              <a:t>No menu Depurar, escolha </a:t>
+            </a:r>
+            <a:r>
+              <a:rPr lang="pt-BR" dirty="0"/>
+              <a:t>a opção </a:t>
+            </a:r>
+            <a:r>
+              <a:rPr lang="pt-BR" b="1" i="1" dirty="0" smtClean="0"/>
+              <a:t>Propriedades de &lt;nome-do-projeto&gt; ...</a:t>
+            </a:r>
+            <a:r>
+              <a:rPr lang="pt-BR" dirty="0" smtClean="0"/>
+              <a:t> </a:t>
+            </a:r>
+            <a:r>
+              <a:rPr lang="pt-BR" dirty="0"/>
+              <a:t>para </a:t>
+            </a:r>
+            <a:r>
+              <a:rPr lang="pt-BR" dirty="0" smtClean="0"/>
+              <a:t>abrir a caixa de diálogo </a:t>
+            </a:r>
+            <a:r>
+              <a:rPr lang="pt-BR" b="1" i="1" dirty="0" smtClean="0"/>
+              <a:t>Páginas de Propriedades da &lt;nome-do-projeto&gt;</a:t>
+            </a:r>
+            <a:r>
+              <a:rPr lang="pt-BR" dirty="0" smtClean="0"/>
+              <a:t>.</a:t>
+            </a:r>
+            <a:endParaRPr lang="pt-BR" dirty="0"/>
           </a:p>
         </p:txBody>
       </p:sp>
       <p:pic>
         <p:nvPicPr>
-          <p:cNvPr id="2" name="Picture 1">
-            <a:extLst>
-              <a:ext uri="{FF2B5EF4-FFF2-40B4-BE49-F238E27FC236}">
-                <a16:creationId xmlns:a16="http://schemas.microsoft.com/office/drawing/2014/main" id="{8939CFFD-E748-4599-9933-83B0DEC168F4}"/>
-              </a:ext>
-            </a:extLst>
-          </p:cNvPr>
+          <p:cNvPr id="3" name="Imagem 2"/>
           <p:cNvPicPr>
             <a:picLocks noChangeAspect="1"/>
           </p:cNvPicPr>
           <p:nvPr/>
         </p:nvPicPr>
-        <p:blipFill>
+        <p:blipFill rotWithShape="1">
           <a:blip r:embed="rId2"/>
-          <a:stretch>
-            <a:fillRect/>
-          </a:stretch>
+          <a:srcRect b="28175"/>
+          <a:stretch/>
         </p:blipFill>
         <p:spPr>
           <a:xfrm>
             <a:off x="2728913" y="2973034"/>
-            <a:ext cx="6734175" cy="3256992"/>
+            <a:ext cx="6734175" cy="3283387"/>
           </a:xfrm>
           <a:prstGeom prst="rect">
             <a:avLst/>
@@ -5167,7 +5177,7 @@
         <p:spPr>
           <a:xfrm>
             <a:off x="317694" y="1291053"/>
-            <a:ext cx="11705493" cy="1746061"/>
+            <a:ext cx="11705493" cy="2309397"/>
           </a:xfrm>
         </p:spPr>
         <p:txBody>
@@ -5181,72 +5191,94 @@
               <a:t>No menu esquerdo, escolha a opção </a:t>
             </a:r>
             <a:r>
-              <a:rPr lang="pt-BR" b="1" i="1" dirty="0"/>
+              <a:rPr lang="pt-BR" b="1" i="1" dirty="0" smtClean="0"/>
+              <a:t>Depuração</a:t>
+            </a:r>
+            <a:r>
+              <a:rPr lang="pt-BR" dirty="0" smtClean="0"/>
+              <a:t> </a:t>
+            </a:r>
+            <a:r>
+              <a:rPr lang="pt-BR" dirty="0"/>
+              <a:t>para que as configurações de debug sejam visualizadas à direita. Altere os campos </a:t>
+            </a:r>
+            <a:r>
+              <a:rPr lang="pt-BR" b="1" i="1" dirty="0" smtClean="0"/>
+              <a:t>Configuração</a:t>
+            </a:r>
+            <a:r>
+              <a:rPr lang="pt-BR" dirty="0" smtClean="0"/>
+              <a:t> </a:t>
+            </a:r>
+            <a:r>
+              <a:rPr lang="pt-BR" dirty="0"/>
+              <a:t>para </a:t>
+            </a:r>
+            <a:r>
+              <a:rPr lang="pt-BR" b="1" i="1" dirty="0" smtClean="0"/>
               <a:t>Debug</a:t>
             </a:r>
             <a:r>
-              <a:rPr lang="pt-BR" dirty="0"/>
-              <a:t> para que as configurações de debug sejam visualizadas à direita. Altere os campos </a:t>
-            </a:r>
-            <a:r>
-              <a:rPr lang="pt-BR" b="1" i="1" dirty="0"/>
-              <a:t>Configuration</a:t>
-            </a:r>
-            <a:r>
-              <a:rPr lang="pt-BR" dirty="0"/>
+              <a:rPr lang="pt-BR" dirty="0" smtClean="0"/>
+              <a:t>, </a:t>
+            </a:r>
+            <a:r>
+              <a:rPr lang="pt-BR" b="1" i="1" dirty="0" err="1" smtClean="0"/>
+              <a:t>Platforma</a:t>
+            </a:r>
+            <a:r>
+              <a:rPr lang="pt-BR" dirty="0" smtClean="0"/>
+              <a:t> </a:t>
+            </a:r>
+            <a:r>
+              <a:rPr lang="pt-BR" dirty="0"/>
+              <a:t>para </a:t>
+            </a:r>
+            <a:r>
+              <a:rPr lang="pt-BR" b="1" i="1" dirty="0" smtClean="0"/>
+              <a:t>x64</a:t>
+            </a:r>
+            <a:r>
+              <a:rPr lang="pt-BR" dirty="0" smtClean="0"/>
+              <a:t> e </a:t>
+            </a:r>
+            <a:r>
+              <a:rPr lang="pt-BR" b="1" i="1" dirty="0" smtClean="0"/>
+              <a:t>Depurador a iniciar</a:t>
+            </a:r>
+            <a:r>
+              <a:rPr lang="pt-BR" dirty="0" smtClean="0"/>
               <a:t> para </a:t>
             </a:r>
             <a:r>
-              <a:rPr lang="pt-BR" b="1" i="1" dirty="0"/>
-              <a:t>Debug</a:t>
-            </a:r>
-            <a:r>
-              <a:rPr lang="pt-BR" dirty="0"/>
-              <a:t> e </a:t>
-            </a:r>
-            <a:r>
-              <a:rPr lang="pt-BR" b="1" i="1" dirty="0"/>
-              <a:t>Platform</a:t>
-            </a:r>
-            <a:r>
-              <a:rPr lang="pt-BR" dirty="0"/>
-              <a:t> para </a:t>
-            </a:r>
-            <a:r>
-              <a:rPr lang="pt-BR" b="1" i="1" dirty="0"/>
-              <a:t>x64</a:t>
-            </a:r>
-            <a:r>
-              <a:rPr lang="pt-BR" dirty="0"/>
+              <a:rPr lang="pt-BR" b="1" i="1" dirty="0" smtClean="0"/>
+              <a:t>Computador Remoto</a:t>
+            </a:r>
+            <a:r>
+              <a:rPr lang="pt-BR" dirty="0" smtClean="0"/>
               <a:t>.</a:t>
             </a:r>
+            <a:endParaRPr lang="pt-BR" dirty="0"/>
           </a:p>
         </p:txBody>
       </p:sp>
       <p:pic>
         <p:nvPicPr>
-          <p:cNvPr id="2" name="Picture 1">
-            <a:extLst>
-              <a:ext uri="{FF2B5EF4-FFF2-40B4-BE49-F238E27FC236}">
-                <a16:creationId xmlns:a16="http://schemas.microsoft.com/office/drawing/2014/main" id="{D173BCA6-E90C-4527-9FF2-6DE03EF00AA7}"/>
-              </a:ext>
-            </a:extLst>
-          </p:cNvPr>
+          <p:cNvPr id="4" name="Imagem 3"/>
           <p:cNvPicPr>
             <a:picLocks noChangeAspect="1"/>
           </p:cNvPicPr>
           <p:nvPr/>
         </p:nvPicPr>
-        <p:blipFill>
+        <p:blipFill rotWithShape="1">
           <a:blip r:embed="rId2"/>
-          <a:stretch>
-            <a:fillRect/>
-          </a:stretch>
+          <a:srcRect b="44639"/>
+          <a:stretch/>
         </p:blipFill>
         <p:spPr>
           <a:xfrm>
-            <a:off x="2614612" y="3193593"/>
-            <a:ext cx="6962775" cy="2724150"/>
+            <a:off x="2614612" y="3593644"/>
+            <a:ext cx="6962775" cy="2616656"/>
           </a:xfrm>
           <a:prstGeom prst="rect">
             <a:avLst/>
@@ -5267,8 +5299,62 @@
         </p:nvSpPr>
         <p:spPr>
           <a:xfrm>
-            <a:off x="4124325" y="3505200"/>
-            <a:ext cx="4752975" cy="342900"/>
+            <a:off x="2674620" y="3920490"/>
+            <a:ext cx="5128260" cy="256382"/>
+          </a:xfrm>
+          <a:prstGeom prst="rect">
+            <a:avLst/>
+          </a:prstGeom>
+          <a:noFill/>
+          <a:ln w="28575" cap="flat" cmpd="sng" algn="ctr">
+            <a:solidFill>
+              <a:schemeClr val="accent2"/>
+            </a:solidFill>
+            <a:prstDash val="solid"/>
+            <a:round/>
+            <a:headEnd type="none" w="med" len="med"/>
+            <a:tailEnd type="none" w="med" len="med"/>
+          </a:ln>
+        </p:spPr>
+        <p:style>
+          <a:lnRef idx="0">
+            <a:scrgbClr r="0" g="0" b="0"/>
+          </a:lnRef>
+          <a:fillRef idx="0">
+            <a:scrgbClr r="0" g="0" b="0"/>
+          </a:fillRef>
+          <a:effectRef idx="0">
+            <a:scrgbClr r="0" g="0" b="0"/>
+          </a:effectRef>
+          <a:fontRef idx="minor">
+            <a:schemeClr val="accent2"/>
+          </a:fontRef>
+        </p:style>
+        <p:txBody>
+          <a:bodyPr rtlCol="0" anchor="ctr"/>
+          <a:lstStyle/>
+          <a:p>
+            <a:pPr algn="ctr"/>
+            <a:endParaRPr lang="en-US"/>
+          </a:p>
+        </p:txBody>
+      </p:sp>
+      <p:sp>
+        <p:nvSpPr>
+          <p:cNvPr id="7" name="Rectangle 2">
+            <a:extLst>
+              <a:ext uri="{FF2B5EF4-FFF2-40B4-BE49-F238E27FC236}">
+                <a16:creationId xmlns:a16="http://schemas.microsoft.com/office/drawing/2014/main" id="{7795D9D7-ACEA-4FBC-B94E-F19FBD096C29}"/>
+              </a:ext>
+            </a:extLst>
+          </p:cNvPr>
+          <p:cNvSpPr/>
+          <p:nvPr/>
+        </p:nvSpPr>
+        <p:spPr>
+          <a:xfrm>
+            <a:off x="4381500" y="4205160"/>
+            <a:ext cx="5128260" cy="462089"/>
           </a:xfrm>
           <a:prstGeom prst="rect">
             <a:avLst/>
@@ -5561,7 +5647,7 @@
         <p:spPr>
           <a:xfrm>
             <a:off x="317694" y="1291053"/>
-            <a:ext cx="11705493" cy="2137947"/>
+            <a:ext cx="11705493" cy="1242597"/>
           </a:xfrm>
         </p:spPr>
         <p:txBody>
@@ -5572,67 +5658,60 @@
           <a:p>
             <a:r>
               <a:rPr lang="pt-BR" dirty="0"/>
-              <a:t>... Localize o console na rede, alterando o valor da propriedade </a:t>
-            </a:r>
-            <a:r>
-              <a:rPr lang="pt-BR" b="1" i="1" dirty="0"/>
-              <a:t>Target device</a:t>
-            </a:r>
-            <a:r>
-              <a:rPr lang="pt-BR" dirty="0"/>
-              <a:t> para </a:t>
-            </a:r>
-            <a:r>
-              <a:rPr lang="pt-BR" b="1" i="1" dirty="0"/>
-              <a:t>Remote Machine</a:t>
-            </a:r>
-            <a:r>
-              <a:rPr lang="pt-BR" dirty="0"/>
-              <a:t> e inserindo o IP do console na propriedade </a:t>
-            </a:r>
-            <a:r>
-              <a:rPr lang="pt-BR" b="1" i="1" dirty="0"/>
-              <a:t>Remote machine</a:t>
-            </a:r>
-            <a:r>
-              <a:rPr lang="pt-BR" dirty="0"/>
-              <a:t>. Depois clique no botão </a:t>
-            </a:r>
-            <a:r>
-              <a:rPr lang="pt-BR" b="1" i="1" dirty="0"/>
-              <a:t>Find</a:t>
-            </a:r>
-            <a:r>
-              <a:rPr lang="pt-BR" dirty="0"/>
+              <a:t>... Localize o console na rede, </a:t>
+            </a:r>
+            <a:r>
+              <a:rPr lang="pt-BR" dirty="0" smtClean="0"/>
+              <a:t>clicando em &lt;</a:t>
+            </a:r>
+            <a:r>
+              <a:rPr lang="pt-BR" b="1" i="1" dirty="0" err="1" smtClean="0"/>
+              <a:t>Locate</a:t>
+            </a:r>
+            <a:r>
+              <a:rPr lang="pt-BR" b="1" i="1" dirty="0" smtClean="0"/>
+              <a:t>...&gt;</a:t>
+            </a:r>
+            <a:r>
+              <a:rPr lang="pt-BR" dirty="0" smtClean="0"/>
+              <a:t> na propriedade </a:t>
+            </a:r>
+            <a:r>
+              <a:rPr lang="pt-BR" b="1" i="1" dirty="0" smtClean="0"/>
+              <a:t>Nome do Computador</a:t>
+            </a:r>
+            <a:r>
+              <a:rPr lang="pt-BR" dirty="0" smtClean="0"/>
               <a:t>.</a:t>
             </a:r>
+            <a:endParaRPr lang="pt-BR" dirty="0"/>
           </a:p>
         </p:txBody>
       </p:sp>
       <p:pic>
         <p:nvPicPr>
-          <p:cNvPr id="2" name="Picture 1">
-            <a:extLst>
-              <a:ext uri="{FF2B5EF4-FFF2-40B4-BE49-F238E27FC236}">
-                <a16:creationId xmlns:a16="http://schemas.microsoft.com/office/drawing/2014/main" id="{409E7B5B-545D-4AC0-83DF-E28746DD4650}"/>
-              </a:ext>
-            </a:extLst>
-          </p:cNvPr>
+          <p:cNvPr id="7" name="Imagem 6"/>
           <p:cNvPicPr>
             <a:picLocks noChangeAspect="1"/>
           </p:cNvPicPr>
           <p:nvPr/>
         </p:nvPicPr>
         <p:blipFill>
-          <a:blip r:embed="rId2"/>
+          <a:blip r:embed="rId2">
+            <a:extLst>
+              <a:ext uri="{28A0092B-C50C-407E-A947-70E740481C1C}">
+                <a14:useLocalDpi xmlns:a14="http://schemas.microsoft.com/office/drawing/2010/main" val="0"/>
+              </a:ext>
+            </a:extLst>
+          </a:blip>
           <a:stretch>
             <a:fillRect/>
           </a:stretch>
         </p:blipFill>
         <p:spPr>
           <a:xfrm>
-            <a:off x="2595562" y="3477990"/>
-            <a:ext cx="7000875" cy="2743200"/>
+            <a:off x="2204495" y="2590305"/>
+            <a:ext cx="7783011" cy="3543795"/>
           </a:xfrm>
           <a:prstGeom prst="rect">
             <a:avLst/>
@@ -5653,8 +5732,8 @@
         </p:nvSpPr>
         <p:spPr>
           <a:xfrm>
-            <a:off x="4324349" y="5211540"/>
-            <a:ext cx="5272087" cy="495300"/>
+            <a:off x="4324349" y="4373340"/>
+            <a:ext cx="5663157" cy="495300"/>
           </a:xfrm>
           <a:prstGeom prst="rect">
             <a:avLst/>
@@ -5771,7 +5850,23 @@
           <a:p>
             <a:r>
               <a:rPr lang="pt-BR" dirty="0"/>
-              <a:t>Neste material será apresentado um passo a passo para realizar debug dos jogos criados no Unity 3D em um console Xbox One, por meio do Visual Studio Community 2017 instalado em um computador com sistema operacional Windows 10.</a:t>
+              <a:t>Neste material será apresentado um passo a passo para realizar debug dos jogos criados no Unity 3D em um console Xbox One, por meio do Visual Studio </a:t>
+            </a:r>
+            <a:r>
+              <a:rPr lang="pt-BR" dirty="0" err="1"/>
+              <a:t>Community</a:t>
+            </a:r>
+            <a:r>
+              <a:rPr lang="pt-BR" dirty="0"/>
+              <a:t> </a:t>
+            </a:r>
+            <a:r>
+              <a:rPr lang="pt-BR" dirty="0" smtClean="0"/>
+              <a:t>2019 </a:t>
+            </a:r>
+            <a:r>
+              <a:rPr lang="pt-BR" dirty="0"/>
+              <a:t>instalado em um computador com sistema operacional Windows 10.</a:t>
             </a:r>
           </a:p>
         </p:txBody>
@@ -5864,33 +5959,40 @@
               <a:t>Na caixa de diálogo </a:t>
             </a:r>
             <a:r>
-              <a:rPr lang="pt-BR" b="1" i="1" dirty="0"/>
-              <a:t>Remote Connections</a:t>
-            </a:r>
-            <a:r>
-              <a:rPr lang="pt-BR" dirty="0"/>
-              <a:t>, clique no botão </a:t>
-            </a:r>
-            <a:r>
-              <a:rPr lang="pt-BR" b="1" i="1" dirty="0"/>
-              <a:t>Select</a:t>
-            </a:r>
-            <a:r>
-              <a:rPr lang="pt-BR" dirty="0"/>
-              <a:t> do dispositivo encontrado.</a:t>
-            </a:r>
+              <a:rPr lang="pt-BR" b="1" i="1" dirty="0" smtClean="0"/>
+              <a:t>Conexões Remotas</a:t>
+            </a:r>
+            <a:r>
+              <a:rPr lang="pt-BR" dirty="0" smtClean="0"/>
+              <a:t>, insira o IP do console no campo </a:t>
+            </a:r>
+            <a:r>
+              <a:rPr lang="pt-BR" b="1" i="1" dirty="0" smtClean="0"/>
+              <a:t>Endereço</a:t>
+            </a:r>
+            <a:r>
+              <a:rPr lang="pt-BR" dirty="0" smtClean="0"/>
+              <a:t> e clique </a:t>
+            </a:r>
+            <a:r>
+              <a:rPr lang="pt-BR" dirty="0"/>
+              <a:t>no botão </a:t>
+            </a:r>
+            <a:r>
+              <a:rPr lang="pt-BR" b="1" i="1" dirty="0" smtClean="0"/>
+              <a:t>Selecionar</a:t>
+            </a:r>
+            <a:r>
+              <a:rPr lang="pt-BR" dirty="0" smtClean="0"/>
+              <a:t>.</a:t>
+            </a:r>
+            <a:endParaRPr lang="pt-BR" dirty="0"/>
           </a:p>
         </p:txBody>
       </p:sp>
       <p:pic>
         <p:nvPicPr>
-          <p:cNvPr id="4" name="Picture 3">
-            <a:extLst>
-              <a:ext uri="{FF2B5EF4-FFF2-40B4-BE49-F238E27FC236}">
-                <a16:creationId xmlns:a16="http://schemas.microsoft.com/office/drawing/2014/main" id="{1B910B72-8A2D-45EA-BC0C-E6E899551FEA}"/>
-              </a:ext>
-            </a:extLst>
-          </p:cNvPr>
+          <p:cNvPr id="2" name="Imagem 1"/>
           <p:cNvPicPr>
             <a:picLocks noChangeAspect="1"/>
           </p:cNvPicPr>
@@ -5898,13 +6000,13 @@
         </p:nvPicPr>
         <p:blipFill rotWithShape="1">
           <a:blip r:embed="rId2"/>
-          <a:srcRect b="46428"/>
+          <a:srcRect b="45076"/>
           <a:stretch/>
         </p:blipFill>
         <p:spPr>
           <a:xfrm>
-            <a:off x="4019550" y="2759527"/>
-            <a:ext cx="4152900" cy="2694214"/>
+            <a:off x="4019550" y="2667000"/>
+            <a:ext cx="4152900" cy="2762250"/>
           </a:xfrm>
           <a:prstGeom prst="rect">
             <a:avLst/>
@@ -5999,12 +6101,16 @@
               <a:t>Na barra de ferramentas do Visual Studio, altere o combo </a:t>
             </a:r>
             <a:r>
-              <a:rPr lang="pt-BR" b="1" i="1" dirty="0"/>
-              <a:t>Solution Configurations</a:t>
-            </a:r>
-            <a:r>
-              <a:rPr lang="pt-BR" dirty="0"/>
-              <a:t> para </a:t>
+              <a:rPr lang="pt-BR" b="1" i="1" dirty="0" smtClean="0"/>
+              <a:t>Configurações da Solução</a:t>
+            </a:r>
+            <a:r>
+              <a:rPr lang="pt-BR" dirty="0" smtClean="0"/>
+              <a:t> </a:t>
+            </a:r>
+            <a:r>
+              <a:rPr lang="pt-BR" dirty="0"/>
+              <a:t>para </a:t>
             </a:r>
             <a:r>
               <a:rPr lang="pt-BR" b="1" i="1" dirty="0"/>
@@ -6015,12 +6121,24 @@
               <a:t> e o combo </a:t>
             </a:r>
             <a:r>
+              <a:rPr lang="pt-BR" b="1" i="1" dirty="0" err="1"/>
+              <a:t>Solution</a:t>
+            </a:r>
+            <a:r>
               <a:rPr lang="pt-BR" b="1" i="1" dirty="0"/>
-              <a:t>Solution Platforms</a:t>
-            </a:r>
-            <a:r>
-              <a:rPr lang="pt-BR" dirty="0"/>
-              <a:t> para </a:t>
+              <a:t> </a:t>
+            </a:r>
+            <a:r>
+              <a:rPr lang="pt-BR" b="1" i="1" dirty="0" smtClean="0"/>
+              <a:t>Plataformas da Solução</a:t>
+            </a:r>
+            <a:r>
+              <a:rPr lang="pt-BR" dirty="0" smtClean="0"/>
+              <a:t> </a:t>
+            </a:r>
+            <a:r>
+              <a:rPr lang="pt-BR" dirty="0"/>
+              <a:t>para </a:t>
             </a:r>
             <a:r>
               <a:rPr lang="pt-BR" b="1" i="1" dirty="0"/>
@@ -6031,25 +6149,20 @@
               <a:t> e execute o projeto clicando em </a:t>
             </a:r>
             <a:r>
-              <a:rPr lang="pt-BR" b="1" i="1" dirty="0"/>
-              <a:t>Remote Machine</a:t>
-            </a:r>
-            <a:r>
-              <a:rPr lang="pt-BR" dirty="0"/>
+              <a:rPr lang="pt-BR" b="1" i="1" dirty="0" smtClean="0"/>
+              <a:t>Computador Remoto</a:t>
+            </a:r>
+            <a:r>
+              <a:rPr lang="pt-BR" dirty="0" smtClean="0"/>
               <a:t>.</a:t>
             </a:r>
+            <a:endParaRPr lang="pt-BR" dirty="0"/>
           </a:p>
         </p:txBody>
       </p:sp>
       <p:pic>
         <p:nvPicPr>
-          <p:cNvPr id="2" name="Picture 1">
-            <a:extLst>
-              <a:ext uri="{FF2B5EF4-FFF2-40B4-BE49-F238E27FC236}">
-                <a16:creationId xmlns:a16="http://schemas.microsoft.com/office/drawing/2014/main" id="{4743EACD-99CB-4479-9B28-4AC292CFACB6}"/>
-              </a:ext>
-            </a:extLst>
-          </p:cNvPr>
+          <p:cNvPr id="4" name="Imagem 3"/>
           <p:cNvPicPr>
             <a:picLocks noChangeAspect="1"/>
           </p:cNvPicPr>
@@ -6063,8 +6176,8 @@
         </p:blipFill>
         <p:spPr>
           <a:xfrm>
-            <a:off x="1849012" y="3798435"/>
-            <a:ext cx="8493976" cy="1113744"/>
+            <a:off x="1037332" y="3742821"/>
+            <a:ext cx="10117336" cy="981075"/>
           </a:xfrm>
           <a:prstGeom prst="rect">
             <a:avLst/>
@@ -6085,8 +6198,8 @@
         </p:nvSpPr>
         <p:spPr>
           <a:xfrm>
-            <a:off x="5467350" y="4467225"/>
-            <a:ext cx="4260850" cy="447675"/>
+            <a:off x="5162550" y="4228597"/>
+            <a:ext cx="5238750" cy="447675"/>
           </a:xfrm>
           <a:prstGeom prst="rect">
             <a:avLst/>
@@ -6210,7 +6323,15 @@
           <a:p>
             <a:r>
               <a:rPr lang="pt-BR" dirty="0"/>
-              <a:t>Durante o processo de compilação e envio de dados para o console, será solicitado o número PIN do console</a:t>
+              <a:t>Durante o processo de compilação e envio de dados para o console, </a:t>
+            </a:r>
+            <a:r>
+              <a:rPr lang="pt-BR" dirty="0" smtClean="0"/>
+              <a:t>pode ser </a:t>
+            </a:r>
+            <a:r>
+              <a:rPr lang="pt-BR" dirty="0"/>
+              <a:t>solicitado o número PIN do console</a:t>
             </a:r>
           </a:p>
         </p:txBody>

</xml_diff>